<commit_message>
new folder for brochure and the remarks
</commit_message>
<xml_diff>
--- a/Logo-powerpoint/3rd presentation (2nd revised).pptx
+++ b/Logo-powerpoint/3rd presentation (2nd revised).pptx
@@ -332,11 +332,11 @@
           <c:showBubbleSize val="0"/>
         </c:dLbls>
         <c:gapWidth val="150"/>
-        <c:axId val="54116352"/>
-        <c:axId val="89134720"/>
+        <c:axId val="96450048"/>
+        <c:axId val="61012160"/>
       </c:barChart>
       <c:catAx>
-        <c:axId val="54116352"/>
+        <c:axId val="96450048"/>
         <c:scaling>
           <c:orientation val="minMax"/>
         </c:scaling>
@@ -345,7 +345,7 @@
         <c:majorTickMark val="out"/>
         <c:minorTickMark val="none"/>
         <c:tickLblPos val="nextTo"/>
-        <c:crossAx val="89134720"/>
+        <c:crossAx val="61012160"/>
         <c:crosses val="autoZero"/>
         <c:auto val="1"/>
         <c:lblAlgn val="ctr"/>
@@ -353,7 +353,7 @@
         <c:noMultiLvlLbl val="0"/>
       </c:catAx>
       <c:valAx>
-        <c:axId val="89134720"/>
+        <c:axId val="61012160"/>
         <c:scaling>
           <c:orientation val="minMax"/>
           <c:max val="900"/>
@@ -364,7 +364,7 @@
         <c:majorTickMark val="out"/>
         <c:minorTickMark val="none"/>
         <c:tickLblPos val="nextTo"/>
-        <c:crossAx val="54116352"/>
+        <c:crossAx val="96450048"/>
         <c:crosses val="autoZero"/>
         <c:crossBetween val="between"/>
       </c:valAx>
@@ -485,11 +485,11 @@
           <c:showBubbleSize val="0"/>
         </c:dLbls>
         <c:gapWidth val="150"/>
-        <c:axId val="54116864"/>
-        <c:axId val="56008704"/>
+        <c:axId val="96450560"/>
+        <c:axId val="81960960"/>
       </c:barChart>
       <c:catAx>
-        <c:axId val="54116864"/>
+        <c:axId val="96450560"/>
         <c:scaling>
           <c:orientation val="minMax"/>
         </c:scaling>
@@ -498,7 +498,7 @@
         <c:majorTickMark val="out"/>
         <c:minorTickMark val="none"/>
         <c:tickLblPos val="nextTo"/>
-        <c:crossAx val="56008704"/>
+        <c:crossAx val="81960960"/>
         <c:crosses val="autoZero"/>
         <c:auto val="1"/>
         <c:lblAlgn val="ctr"/>
@@ -506,7 +506,7 @@
         <c:noMultiLvlLbl val="0"/>
       </c:catAx>
       <c:valAx>
-        <c:axId val="56008704"/>
+        <c:axId val="81960960"/>
         <c:scaling>
           <c:orientation val="minMax"/>
         </c:scaling>
@@ -516,7 +516,7 @@
         <c:majorTickMark val="out"/>
         <c:minorTickMark val="none"/>
         <c:tickLblPos val="nextTo"/>
-        <c:crossAx val="54116864"/>
+        <c:crossAx val="96450560"/>
         <c:crosses val="autoZero"/>
         <c:crossBetween val="between"/>
       </c:valAx>
@@ -781,11 +781,11 @@
           <c:showBubbleSize val="0"/>
         </c:dLbls>
         <c:gapWidth val="150"/>
-        <c:axId val="108813824"/>
-        <c:axId val="56013888"/>
+        <c:axId val="97039872"/>
+        <c:axId val="81966720"/>
       </c:barChart>
       <c:catAx>
-        <c:axId val="108813824"/>
+        <c:axId val="97039872"/>
         <c:scaling>
           <c:orientation val="minMax"/>
         </c:scaling>
@@ -794,7 +794,7 @@
         <c:majorTickMark val="out"/>
         <c:minorTickMark val="none"/>
         <c:tickLblPos val="nextTo"/>
-        <c:crossAx val="56013888"/>
+        <c:crossAx val="81966720"/>
         <c:crosses val="autoZero"/>
         <c:auto val="1"/>
         <c:lblAlgn val="ctr"/>
@@ -802,7 +802,7 @@
         <c:noMultiLvlLbl val="0"/>
       </c:catAx>
       <c:valAx>
-        <c:axId val="56013888"/>
+        <c:axId val="81966720"/>
         <c:scaling>
           <c:orientation val="minMax"/>
           <c:max val="30"/>
@@ -813,7 +813,7 @@
         <c:majorTickMark val="out"/>
         <c:minorTickMark val="none"/>
         <c:tickLblPos val="nextTo"/>
-        <c:crossAx val="108813824"/>
+        <c:crossAx val="97039872"/>
         <c:crosses val="autoZero"/>
         <c:crossBetween val="between"/>
       </c:valAx>
@@ -920,11 +920,11 @@
           <c:showBubbleSize val="0"/>
         </c:dLbls>
         <c:gapWidth val="150"/>
-        <c:axId val="108855296"/>
-        <c:axId val="56015616"/>
+        <c:axId val="97040384"/>
+        <c:axId val="81920000"/>
       </c:barChart>
       <c:catAx>
-        <c:axId val="108855296"/>
+        <c:axId val="97040384"/>
         <c:scaling>
           <c:orientation val="minMax"/>
         </c:scaling>
@@ -933,7 +933,7 @@
         <c:majorTickMark val="out"/>
         <c:minorTickMark val="none"/>
         <c:tickLblPos val="nextTo"/>
-        <c:crossAx val="56015616"/>
+        <c:crossAx val="81920000"/>
         <c:crosses val="autoZero"/>
         <c:auto val="1"/>
         <c:lblAlgn val="ctr"/>
@@ -941,7 +941,7 @@
         <c:noMultiLvlLbl val="0"/>
       </c:catAx>
       <c:valAx>
-        <c:axId val="56015616"/>
+        <c:axId val="81920000"/>
         <c:scaling>
           <c:orientation val="minMax"/>
         </c:scaling>
@@ -951,7 +951,7 @@
         <c:majorTickMark val="out"/>
         <c:minorTickMark val="none"/>
         <c:tickLblPos val="nextTo"/>
-        <c:crossAx val="108855296"/>
+        <c:crossAx val="97040384"/>
         <c:crosses val="autoZero"/>
         <c:crossBetween val="between"/>
       </c:valAx>
@@ -9386,15 +9386,7 @@
                     <a:schemeClr val="bg1"/>
                   </a:solidFill>
                 </a:rPr>
-                <a:t>Market </a:t>
-              </a:r>
-              <a:r>
-                <a:rPr lang="en-US" sz="2000" dirty="0" smtClean="0">
-                  <a:solidFill>
-                    <a:schemeClr val="bg1"/>
-                  </a:solidFill>
-                </a:rPr>
-                <a:t>Size – Porter 5 Forces</a:t>
+                <a:t>Market Size – Porter 5 Forces</a:t>
               </a:r>
               <a:endParaRPr lang="en-US" sz="2000" dirty="0">
                 <a:solidFill>
@@ -9672,6 +9664,13 @@
   <p:clrMapOvr>
     <a:masterClrMapping/>
   </p:clrMapOvr>
+  <p:timing>
+    <p:tnLst>
+      <p:par>
+        <p:cTn id="1" dur="indefinite" restart="never" nodeType="tmRoot"/>
+      </p:par>
+    </p:tnLst>
+  </p:timing>
 </p:sld>
 </file>
 
@@ -10925,15 +10924,7 @@
                   <a:srgbClr val="505050"/>
                 </a:solidFill>
               </a:rPr>
-              <a:t>, </a:t>
-            </a:r>
-            <a:r>
-              <a:rPr lang="en-US" sz="1100" dirty="0" smtClean="0">
-                <a:solidFill>
-                  <a:srgbClr val="505050"/>
-                </a:solidFill>
-              </a:rPr>
-              <a:t>2012</a:t>
+              <a:t>, 2012</a:t>
             </a:r>
           </a:p>
           <a:p>
@@ -11666,11 +11657,6 @@
               </a:rPr>
               <a:t>Source: </a:t>
             </a:r>
-            <a:endParaRPr lang="en-US" sz="1200" dirty="0" smtClean="0">
-              <a:solidFill>
-                <a:srgbClr val="505050"/>
-              </a:solidFill>
-            </a:endParaRPr>
           </a:p>
           <a:p>
             <a:pPr algn="r"/>
@@ -11680,15 +11666,7 @@
                   <a:srgbClr val="505050"/>
                 </a:solidFill>
               </a:rPr>
-              <a:t>FAO, </a:t>
-            </a:r>
-            <a:r>
-              <a:rPr lang="en-US" sz="1200" dirty="0" smtClean="0">
-                <a:solidFill>
-                  <a:srgbClr val="505050"/>
-                </a:solidFill>
-              </a:rPr>
-              <a:t>2012</a:t>
+              <a:t>FAO, 2012</a:t>
             </a:r>
           </a:p>
           <a:p>
@@ -12406,11 +12384,6 @@
                 </a:rPr>
                 <a:t>Beetle</a:t>
               </a:r>
-              <a:endParaRPr lang="en-US" sz="1400" dirty="0" smtClean="0">
-                <a:solidFill>
-                  <a:srgbClr val="505050"/>
-                </a:solidFill>
-              </a:endParaRPr>
             </a:p>
             <a:p>
               <a:pPr algn="ctr"/>
@@ -12879,11 +12852,6 @@
               </a:rPr>
               <a:t>Source: </a:t>
             </a:r>
-            <a:endParaRPr lang="en-US" sz="1200" dirty="0" smtClean="0">
-              <a:solidFill>
-                <a:srgbClr val="505050"/>
-              </a:solidFill>
-            </a:endParaRPr>
           </a:p>
           <a:p>
             <a:pPr algn="r"/>
@@ -12893,15 +12861,7 @@
                   <a:srgbClr val="505050"/>
                 </a:solidFill>
               </a:rPr>
-              <a:t>FAO, </a:t>
-            </a:r>
-            <a:r>
-              <a:rPr lang="en-US" sz="1200" dirty="0" smtClean="0">
-                <a:solidFill>
-                  <a:srgbClr val="505050"/>
-                </a:solidFill>
-              </a:rPr>
-              <a:t>2012</a:t>
+              <a:t>FAO, 2012</a:t>
             </a:r>
           </a:p>
           <a:p>
@@ -15380,7 +15340,7 @@
           <p:nvPr>
             <p:extLst>
               <p:ext uri="{D42A27DB-BD31-4B8C-83A1-F6EECF244321}">
-                <p14:modId xmlns:p14="http://schemas.microsoft.com/office/powerpoint/2010/main" val="1734948869"/>
+                <p14:modId xmlns:p14="http://schemas.microsoft.com/office/powerpoint/2010/main" val="3779196486"/>
               </p:ext>
             </p:extLst>
           </p:nvPr>
@@ -15499,7 +15459,7 @@
                     <a:p>
                       <a:pPr algn="l" fontAlgn="ctr"/>
                       <a:r>
-                        <a:rPr lang="en-US" sz="1400" u="none" strike="noStrike">
+                        <a:rPr lang="en-US" sz="1400" u="none" strike="noStrike" dirty="0">
                           <a:solidFill>
                             <a:srgbClr val="129793"/>
                           </a:solidFill>
@@ -15507,7 +15467,7 @@
                         </a:rPr>
                         <a:t>Why insect</a:t>
                       </a:r>
-                      <a:endParaRPr lang="en-US" sz="1400" b="1" i="0" u="none" strike="noStrike">
+                      <a:endParaRPr lang="en-US" sz="1400" b="1" i="0" u="none" strike="noStrike" dirty="0">
                         <a:solidFill>
                           <a:srgbClr val="129793"/>
                         </a:solidFill>
@@ -15583,15 +15543,33 @@
                     <a:p>
                       <a:pPr algn="l" fontAlgn="ctr"/>
                       <a:r>
-                        <a:rPr lang="en-US" sz="1400" u="none" strike="noStrike">
+                        <a:rPr lang="en-US" sz="1400" u="none" strike="noStrike" dirty="0">
                           <a:solidFill>
                             <a:srgbClr val="129793"/>
                           </a:solidFill>
                           <a:effectLst/>
                         </a:rPr>
-                        <a:t>Overview o the insect industry today</a:t>
+                        <a:t>Overview </a:t>
                       </a:r>
-                      <a:endParaRPr lang="en-US" sz="1400" b="1" i="0" u="none" strike="noStrike">
+                      <a:r>
+                        <a:rPr lang="en-US" sz="1400" u="none" strike="noStrike" dirty="0" smtClean="0">
+                          <a:solidFill>
+                            <a:srgbClr val="129793"/>
+                          </a:solidFill>
+                          <a:effectLst/>
+                        </a:rPr>
+                        <a:t>of </a:t>
+                      </a:r>
+                      <a:r>
+                        <a:rPr lang="en-US" sz="1400" u="none" strike="noStrike" dirty="0">
+                          <a:solidFill>
+                            <a:srgbClr val="129793"/>
+                          </a:solidFill>
+                          <a:effectLst/>
+                        </a:rPr>
+                        <a:t>the insect industry today</a:t>
+                      </a:r>
+                      <a:endParaRPr lang="en-US" sz="1400" b="1" i="0" u="none" strike="noStrike" dirty="0">
                         <a:solidFill>
                           <a:srgbClr val="129793"/>
                         </a:solidFill>
@@ -15823,12 +15801,12 @@
                     <a:p>
                       <a:pPr algn="l" fontAlgn="ctr"/>
                       <a:r>
-                        <a:rPr lang="en-US" sz="1400" u="none" strike="noStrike">
+                        <a:rPr lang="en-US" sz="1400" u="none" strike="noStrike" dirty="0" smtClean="0">
                           <a:effectLst/>
                         </a:rPr>
-                        <a:t>why westerner disgust of insect</a:t>
+                        <a:t>Why eating insects disgust Westerners</a:t>
                       </a:r>
-                      <a:endParaRPr lang="en-US" sz="1400" b="0" i="0" u="none" strike="noStrike">
+                      <a:endParaRPr lang="en-US" sz="1400" b="0" i="0" u="none" strike="noStrike" dirty="0">
                         <a:solidFill>
                           <a:srgbClr val="000000"/>
                         </a:solidFill>
@@ -15920,12 +15898,24 @@
                     <a:p>
                       <a:pPr algn="l" fontAlgn="ctr"/>
                       <a:r>
-                        <a:rPr lang="en-US" sz="1400" u="none" strike="noStrike">
+                        <a:rPr lang="en-US" sz="1400" u="none" strike="noStrike" dirty="0">
                           <a:effectLst/>
                         </a:rPr>
                         <a:t>insect as novel food in EU, regulation in Belgium </a:t>
                       </a:r>
-                      <a:endParaRPr lang="en-US" sz="1400" b="0" i="0" u="none" strike="noStrike">
+                      <a:r>
+                        <a:rPr lang="en-US" sz="1400" u="none" strike="noStrike" dirty="0" smtClean="0">
+                          <a:effectLst/>
+                        </a:rPr>
+                        <a:t>and</a:t>
+                      </a:r>
+                      <a:r>
+                        <a:rPr lang="en-US" sz="1400" u="none" strike="noStrike" baseline="0" dirty="0" smtClean="0">
+                          <a:effectLst/>
+                        </a:rPr>
+                        <a:t> Netherlands</a:t>
+                      </a:r>
+                      <a:endParaRPr lang="en-US" sz="1400" b="0" i="0" u="none" strike="noStrike" dirty="0">
                         <a:solidFill>
                           <a:srgbClr val="000000"/>
                         </a:solidFill>
@@ -16330,15 +16320,24 @@
                     <a:p>
                       <a:pPr algn="l" fontAlgn="ctr"/>
                       <a:r>
-                        <a:rPr lang="en-US" sz="1400" u="none" strike="noStrike">
+                        <a:rPr lang="en-US" sz="1400" u="none" strike="noStrike" dirty="0">
                           <a:solidFill>
                             <a:srgbClr val="505050"/>
                           </a:solidFill>
                           <a:effectLst/>
                         </a:rPr>
-                        <a:t>Nutritional content and health</a:t>
+                        <a:t>Nutritional content and </a:t>
                       </a:r>
-                      <a:endParaRPr lang="en-US" sz="1400" b="0" i="0" u="none" strike="noStrike">
+                      <a:r>
+                        <a:rPr lang="en-US" sz="1400" u="none" strike="noStrike" dirty="0" smtClean="0">
+                          <a:solidFill>
+                            <a:srgbClr val="505050"/>
+                          </a:solidFill>
+                          <a:effectLst/>
+                        </a:rPr>
+                        <a:t>health benefits</a:t>
+                      </a:r>
+                      <a:endParaRPr lang="en-US" sz="1400" b="0" i="0" u="none" strike="noStrike" dirty="0">
                         <a:solidFill>
                           <a:srgbClr val="505050"/>
                         </a:solidFill>
@@ -16697,7 +16696,7 @@
           <p:nvPr>
             <p:extLst>
               <p:ext uri="{D42A27DB-BD31-4B8C-83A1-F6EECF244321}">
-                <p14:modId xmlns:p14="http://schemas.microsoft.com/office/powerpoint/2010/main" val="914651443"/>
+                <p14:modId xmlns:p14="http://schemas.microsoft.com/office/powerpoint/2010/main" val="1437490894"/>
               </p:ext>
             </p:extLst>
           </p:nvPr>
@@ -16972,12 +16971,24 @@
                     <a:p>
                       <a:pPr algn="l" fontAlgn="ctr"/>
                       <a:r>
-                        <a:rPr lang="en-US" sz="1400" u="none" strike="noStrike">
+                        <a:rPr lang="en-US" sz="1400" u="none" strike="noStrike" dirty="0">
                           <a:effectLst/>
                         </a:rPr>
-                        <a:t>Belgium acceptance on 10 insect species</a:t>
+                        <a:t>Belgium acceptance </a:t>
                       </a:r>
-                      <a:endParaRPr lang="en-US" sz="1400" b="0" i="0" u="none" strike="noStrike">
+                      <a:r>
+                        <a:rPr lang="en-US" sz="1400" u="none" strike="noStrike" dirty="0" smtClean="0">
+                          <a:effectLst/>
+                        </a:rPr>
+                        <a:t>of </a:t>
+                      </a:r>
+                      <a:r>
+                        <a:rPr lang="en-US" sz="1400" u="none" strike="noStrike" dirty="0">
+                          <a:effectLst/>
+                        </a:rPr>
+                        <a:t>10 insect species</a:t>
+                      </a:r>
+                      <a:endParaRPr lang="en-US" sz="1400" b="0" i="0" u="none" strike="noStrike" dirty="0">
                         <a:solidFill>
                           <a:srgbClr val="000000"/>
                         </a:solidFill>
@@ -17020,13 +17031,22 @@
                     <a:p>
                       <a:pPr algn="l" fontAlgn="ctr"/>
                       <a:r>
-                        <a:rPr lang="en-US" sz="1400" u="none" strike="noStrike" dirty="0">
+                        <a:rPr lang="en-US" sz="1400" u="none" strike="noStrike" dirty="0" smtClean="0">
                           <a:solidFill>
                             <a:srgbClr val="505050"/>
                           </a:solidFill>
                           <a:effectLst/>
                         </a:rPr>
-                        <a:t>Prospection legislation</a:t>
+                        <a:t>Prospects</a:t>
+                      </a:r>
+                      <a:r>
+                        <a:rPr lang="en-US" sz="1400" u="none" strike="noStrike" baseline="0" dirty="0" smtClean="0">
+                          <a:solidFill>
+                            <a:srgbClr val="505050"/>
+                          </a:solidFill>
+                          <a:effectLst/>
+                        </a:rPr>
+                        <a:t> of law evolution</a:t>
                       </a:r>
                       <a:endParaRPr lang="en-US" sz="1400" b="0" i="0" u="none" strike="noStrike" dirty="0">
                         <a:solidFill>
@@ -17631,12 +17651,18 @@
                     <a:p>
                       <a:pPr algn="l" fontAlgn="ctr"/>
                       <a:r>
-                        <a:rPr lang="en-US" sz="1400" u="none" strike="noStrike">
+                        <a:rPr lang="en-US" sz="1400" u="none" strike="noStrike" dirty="0" smtClean="0">
                           <a:effectLst/>
                         </a:rPr>
-                        <a:t>comparation with other product in terms of consumption and price</a:t>
+                        <a:t>comparison </a:t>
                       </a:r>
-                      <a:endParaRPr lang="en-US" sz="1400" b="0" i="0" u="none" strike="noStrike">
+                      <a:r>
+                        <a:rPr lang="en-US" sz="1400" u="none" strike="noStrike" dirty="0">
+                          <a:effectLst/>
+                        </a:rPr>
+                        <a:t>with other product in terms of consumption and price</a:t>
+                      </a:r>
+                      <a:endParaRPr lang="en-US" sz="1400" b="0" i="0" u="none" strike="noStrike" dirty="0">
                         <a:solidFill>
                           <a:srgbClr val="000000"/>
                         </a:solidFill>
@@ -17685,7 +17711,16 @@
                           </a:solidFill>
                           <a:effectLst/>
                         </a:rPr>
-                        <a:t>A competitive analysis (5 Porter)</a:t>
+                        <a:t>A competitive analysis (5 </a:t>
+                      </a:r>
+                      <a:r>
+                        <a:rPr lang="en-US" sz="1400" u="none" strike="noStrike" dirty="0" smtClean="0">
+                          <a:solidFill>
+                            <a:srgbClr val="505050"/>
+                          </a:solidFill>
+                          <a:effectLst/>
+                        </a:rPr>
+                        <a:t>Porter Forces)</a:t>
                       </a:r>
                       <a:endParaRPr lang="en-US" sz="1400" b="0" i="0" u="none" strike="noStrike" dirty="0">
                         <a:solidFill>
@@ -17826,12 +17861,18 @@
                     <a:p>
                       <a:pPr algn="l" fontAlgn="ctr"/>
                       <a:r>
-                        <a:rPr lang="en-US" sz="1400" u="none" strike="noStrike">
+                        <a:rPr lang="en-US" sz="1400" u="none" strike="noStrike" dirty="0" smtClean="0">
                           <a:effectLst/>
                         </a:rPr>
-                        <a:t>transparant information in production</a:t>
+                        <a:t>transparent </a:t>
                       </a:r>
-                      <a:endParaRPr lang="en-US" sz="1400" b="0" i="0" u="none" strike="noStrike">
+                      <a:r>
+                        <a:rPr lang="en-US" sz="1400" u="none" strike="noStrike" dirty="0">
+                          <a:effectLst/>
+                        </a:rPr>
+                        <a:t>information in production</a:t>
+                      </a:r>
+                      <a:endParaRPr lang="en-US" sz="1400" b="0" i="0" u="none" strike="noStrike" dirty="0">
                         <a:solidFill>
                           <a:srgbClr val="000000"/>
                         </a:solidFill>
@@ -18224,15 +18265,7 @@
                     <a:schemeClr val="bg1"/>
                   </a:solidFill>
                 </a:rPr>
-                <a:t>Market </a:t>
-              </a:r>
-              <a:r>
-                <a:rPr lang="en-US" sz="2000" dirty="0" smtClean="0">
-                  <a:solidFill>
-                    <a:schemeClr val="bg1"/>
-                  </a:solidFill>
-                </a:rPr>
-                <a:t>Size – Impact Assessment</a:t>
+                <a:t>Market Size – Impact Assessment</a:t>
               </a:r>
               <a:endParaRPr lang="en-US" sz="2000" dirty="0">
                 <a:solidFill>
@@ -19158,15 +19191,7 @@
                     <a:schemeClr val="bg1"/>
                   </a:solidFill>
                 </a:rPr>
-                <a:t>Market </a:t>
-              </a:r>
-              <a:r>
-                <a:rPr lang="en-US" sz="2000" dirty="0" smtClean="0">
-                  <a:solidFill>
-                    <a:schemeClr val="bg1"/>
-                  </a:solidFill>
-                </a:rPr>
-                <a:t>Size – Impact Assessment</a:t>
+                <a:t>Market Size – Impact Assessment</a:t>
               </a:r>
               <a:endParaRPr lang="en-US" sz="2000" dirty="0">
                 <a:solidFill>

</xml_diff>